<commit_message>
updated paper, figures and bibliography
</commit_message>
<xml_diff>
--- a/paper/Figures for paper.pptx
+++ b/paper/Figures for paper.pptx
@@ -5,10 +5,11 @@
     <p:sldMasterId id="2147483692" r:id="rId4"/>
   </p:sldMasterIdLst>
   <p:notesMasterIdLst>
-    <p:notesMasterId r:id="rId6"/>
+    <p:notesMasterId r:id="rId7"/>
   </p:notesMasterIdLst>
   <p:sldIdLst>
     <p:sldId id="678" r:id="rId5"/>
+    <p:sldId id="679" r:id="rId6"/>
   </p:sldIdLst>
   <p:sldSz cx="12192000" cy="6858000"/>
   <p:notesSz cx="6858000" cy="9144000"/>
@@ -781,6 +782,43 @@
     </pc:docChg>
   </pc:docChgLst>
   <pc:docChgLst>
+    <pc:chgData name="Kallitsis, Evangelos" userId="fde4ea10-5b13-49a6-817a-b5296114fd84" providerId="ADAL" clId="{96F23B54-B741-5E4C-9B36-2CBB69B8FAA2}"/>
+    <pc:docChg chg="custSel addSld modSld">
+      <pc:chgData name="Kallitsis, Evangelos" userId="fde4ea10-5b13-49a6-817a-b5296114fd84" providerId="ADAL" clId="{96F23B54-B741-5E4C-9B36-2CBB69B8FAA2}" dt="2024-03-11T14:44:37.793" v="1129"/>
+      <pc:docMkLst>
+        <pc:docMk/>
+      </pc:docMkLst>
+      <pc:sldChg chg="modSp mod">
+        <pc:chgData name="Kallitsis, Evangelos" userId="fde4ea10-5b13-49a6-817a-b5296114fd84" providerId="ADAL" clId="{96F23B54-B741-5E4C-9B36-2CBB69B8FAA2}" dt="2024-03-11T10:41:03.807" v="11" actId="20577"/>
+        <pc:sldMkLst>
+          <pc:docMk/>
+          <pc:sldMk cId="3409161191" sldId="371"/>
+        </pc:sldMkLst>
+      </pc:sldChg>
+      <pc:sldChg chg="modSp mod">
+        <pc:chgData name="Kallitsis, Evangelos" userId="fde4ea10-5b13-49a6-817a-b5296114fd84" providerId="ADAL" clId="{96F23B54-B741-5E4C-9B36-2CBB69B8FAA2}" dt="2024-03-11T10:55:17.941" v="315" actId="20577"/>
+        <pc:sldMkLst>
+          <pc:docMk/>
+          <pc:sldMk cId="2543988049" sldId="411"/>
+        </pc:sldMkLst>
+      </pc:sldChg>
+      <pc:sldChg chg="modSp mod">
+        <pc:chgData name="Kallitsis, Evangelos" userId="fde4ea10-5b13-49a6-817a-b5296114fd84" providerId="ADAL" clId="{96F23B54-B741-5E4C-9B36-2CBB69B8FAA2}" dt="2024-03-11T13:31:38.342" v="1108" actId="20577"/>
+        <pc:sldMkLst>
+          <pc:docMk/>
+          <pc:sldMk cId="3815563939" sldId="432"/>
+        </pc:sldMkLst>
+      </pc:sldChg>
+      <pc:sldChg chg="addSp delSp modSp add mod">
+        <pc:chgData name="Kallitsis, Evangelos" userId="fde4ea10-5b13-49a6-817a-b5296114fd84" providerId="ADAL" clId="{96F23B54-B741-5E4C-9B36-2CBB69B8FAA2}" dt="2024-03-11T14:44:37.793" v="1129"/>
+        <pc:sldMkLst>
+          <pc:docMk/>
+          <pc:sldMk cId="1187593640" sldId="434"/>
+        </pc:sldMkLst>
+      </pc:sldChg>
+    </pc:docChg>
+  </pc:docChgLst>
+  <pc:docChgLst>
     <pc:chgData name="Kallitsis, Evangelos" userId="fde4ea10-5b13-49a6-817a-b5296114fd84" providerId="ADAL" clId="{6A09F2D5-B94E-FB40-A29F-0249DF8006D6}"/>
     <pc:docChg chg="custSel addSld delSld modSld">
       <pc:chgData name="Kallitsis, Evangelos" userId="fde4ea10-5b13-49a6-817a-b5296114fd84" providerId="ADAL" clId="{6A09F2D5-B94E-FB40-A29F-0249DF8006D6}" dt="2024-11-12T13:52:15.979" v="2262" actId="403"/>
@@ -847,43 +885,6 @@
       </pc:sldChg>
     </pc:docChg>
   </pc:docChgLst>
-  <pc:docChgLst>
-    <pc:chgData name="Kallitsis, Evangelos" userId="fde4ea10-5b13-49a6-817a-b5296114fd84" providerId="ADAL" clId="{96F23B54-B741-5E4C-9B36-2CBB69B8FAA2}"/>
-    <pc:docChg chg="custSel addSld modSld">
-      <pc:chgData name="Kallitsis, Evangelos" userId="fde4ea10-5b13-49a6-817a-b5296114fd84" providerId="ADAL" clId="{96F23B54-B741-5E4C-9B36-2CBB69B8FAA2}" dt="2024-03-11T14:44:37.793" v="1129"/>
-      <pc:docMkLst>
-        <pc:docMk/>
-      </pc:docMkLst>
-      <pc:sldChg chg="modSp mod">
-        <pc:chgData name="Kallitsis, Evangelos" userId="fde4ea10-5b13-49a6-817a-b5296114fd84" providerId="ADAL" clId="{96F23B54-B741-5E4C-9B36-2CBB69B8FAA2}" dt="2024-03-11T10:41:03.807" v="11" actId="20577"/>
-        <pc:sldMkLst>
-          <pc:docMk/>
-          <pc:sldMk cId="3409161191" sldId="371"/>
-        </pc:sldMkLst>
-      </pc:sldChg>
-      <pc:sldChg chg="modSp mod">
-        <pc:chgData name="Kallitsis, Evangelos" userId="fde4ea10-5b13-49a6-817a-b5296114fd84" providerId="ADAL" clId="{96F23B54-B741-5E4C-9B36-2CBB69B8FAA2}" dt="2024-03-11T10:55:17.941" v="315" actId="20577"/>
-        <pc:sldMkLst>
-          <pc:docMk/>
-          <pc:sldMk cId="2543988049" sldId="411"/>
-        </pc:sldMkLst>
-      </pc:sldChg>
-      <pc:sldChg chg="modSp mod">
-        <pc:chgData name="Kallitsis, Evangelos" userId="fde4ea10-5b13-49a6-817a-b5296114fd84" providerId="ADAL" clId="{96F23B54-B741-5E4C-9B36-2CBB69B8FAA2}" dt="2024-03-11T13:31:38.342" v="1108" actId="20577"/>
-        <pc:sldMkLst>
-          <pc:docMk/>
-          <pc:sldMk cId="3815563939" sldId="432"/>
-        </pc:sldMkLst>
-      </pc:sldChg>
-      <pc:sldChg chg="addSp delSp modSp add mod">
-        <pc:chgData name="Kallitsis, Evangelos" userId="fde4ea10-5b13-49a6-817a-b5296114fd84" providerId="ADAL" clId="{96F23B54-B741-5E4C-9B36-2CBB69B8FAA2}" dt="2024-03-11T14:44:37.793" v="1129"/>
-        <pc:sldMkLst>
-          <pc:docMk/>
-          <pc:sldMk cId="1187593640" sldId="434"/>
-        </pc:sldMkLst>
-      </pc:sldChg>
-    </pc:docChg>
-  </pc:docChgLst>
 </pc:chgInfo>
 </file>
 
@@ -969,7 +970,7 @@
           <a:p>
             <a:fld id="{1CF99AA1-1C21-7849-92F3-7C7D6DF74BE0}" type="datetimeFigureOut">
               <a:rPr lang="en-US" smtClean="0"/>
-              <a:t>3/14/25</a:t>
+              <a:t>3/17/25</a:t>
             </a:fld>
             <a:endParaRPr lang="en-US" dirty="0"/>
           </a:p>
@@ -1902,7 +1903,7 @@
           <a:p>
             <a:fld id="{B4B3B1ED-B792-43A2-8B5B-D59DA898BC39}" type="datetime1">
               <a:rPr lang="en-GB" smtClean="0"/>
-              <a:t>14/03/2025</a:t>
+              <a:t>17/03/2025</a:t>
             </a:fld>
             <a:endParaRPr lang="en-GB"/>
           </a:p>
@@ -7161,6 +7162,187 @@
     <p:extLst>
       <p:ext uri="{BB962C8B-B14F-4D97-AF65-F5344CB8AC3E}">
         <p14:creationId xmlns:p14="http://schemas.microsoft.com/office/powerpoint/2010/main" val="3322335276"/>
+      </p:ext>
+    </p:extLst>
+  </p:cSld>
+  <p:clrMapOvr>
+    <a:masterClrMapping/>
+  </p:clrMapOvr>
+  <p:transition>
+    <p:fade/>
+  </p:transition>
+</p:sld>
+</file>
+
+<file path=ppt/slides/slide2.xml><?xml version="1.0" encoding="utf-8"?>
+<p:sld xmlns:a="http://schemas.openxmlformats.org/drawingml/2006/main" xmlns:r="http://schemas.openxmlformats.org/officeDocument/2006/relationships" xmlns:p="http://schemas.openxmlformats.org/presentationml/2006/main">
+  <p:cSld>
+    <p:spTree>
+      <p:nvGrpSpPr>
+        <p:cNvPr id="1" name=""/>
+        <p:cNvGrpSpPr/>
+        <p:nvPr/>
+      </p:nvGrpSpPr>
+      <p:grpSpPr>
+        <a:xfrm>
+          <a:off x="0" y="0"/>
+          <a:ext cx="0" cy="0"/>
+          <a:chOff x="0" y="0"/>
+          <a:chExt cx="0" cy="0"/>
+        </a:xfrm>
+      </p:grpSpPr>
+      <p:sp>
+        <p:nvSpPr>
+          <p:cNvPr id="2" name="Slide Number Placeholder 1">
+            <a:extLst>
+              <a:ext uri="{FF2B5EF4-FFF2-40B4-BE49-F238E27FC236}">
+                <a16:creationId xmlns:a16="http://schemas.microsoft.com/office/drawing/2014/main" id="{008C84AB-E265-6FA4-2B1D-5635371D9B9E}"/>
+              </a:ext>
+            </a:extLst>
+          </p:cNvPr>
+          <p:cNvSpPr>
+            <a:spLocks noGrp="1"/>
+          </p:cNvSpPr>
+          <p:nvPr>
+            <p:ph type="sldNum" sz="quarter" idx="12"/>
+          </p:nvPr>
+        </p:nvSpPr>
+        <p:spPr/>
+        <p:txBody>
+          <a:bodyPr/>
+          <a:lstStyle/>
+          <a:p>
+            <a:fld id="{CBA53E11-492D-48B3-9F9B-09541CA2A39A}" type="slidenum">
+              <a:rPr lang="en-GB" smtClean="0"/>
+              <a:pPr/>
+              <a:t>2</a:t>
+            </a:fld>
+            <a:endParaRPr lang="en-GB"/>
+          </a:p>
+        </p:txBody>
+      </p:sp>
+      <p:sp>
+        <p:nvSpPr>
+          <p:cNvPr id="7" name="Rectangle 6">
+            <a:extLst>
+              <a:ext uri="{FF2B5EF4-FFF2-40B4-BE49-F238E27FC236}">
+                <a16:creationId xmlns:a16="http://schemas.microsoft.com/office/drawing/2014/main" id="{E40BF9D5-0495-F41B-9817-147C1A5E52CE}"/>
+              </a:ext>
+            </a:extLst>
+          </p:cNvPr>
+          <p:cNvSpPr/>
+          <p:nvPr/>
+        </p:nvSpPr>
+        <p:spPr>
+          <a:xfrm>
+            <a:off x="2207905" y="135650"/>
+            <a:ext cx="4540028" cy="327729"/>
+          </a:xfrm>
+          <a:prstGeom prst="rect">
+            <a:avLst/>
+          </a:prstGeom>
+          <a:solidFill>
+            <a:schemeClr val="accent1"/>
+          </a:solidFill>
+          <a:ln>
+            <a:noFill/>
+          </a:ln>
+        </p:spPr>
+        <p:style>
+          <a:lnRef idx="2">
+            <a:schemeClr val="accent3"/>
+          </a:lnRef>
+          <a:fillRef idx="1">
+            <a:schemeClr val="lt1"/>
+          </a:fillRef>
+          <a:effectRef idx="0">
+            <a:schemeClr val="accent3"/>
+          </a:effectRef>
+          <a:fontRef idx="minor">
+            <a:schemeClr val="dk1"/>
+          </a:fontRef>
+        </p:style>
+        <p:txBody>
+          <a:bodyPr rtlCol="0" anchor="ctr"/>
+          <a:lstStyle/>
+          <a:p>
+            <a:pPr algn="ctr"/>
+            <a:r>
+              <a:rPr lang="en-US" sz="1600" dirty="0">
+                <a:solidFill>
+                  <a:schemeClr val="bg1"/>
+                </a:solidFill>
+                <a:latin typeface="Segoe UI" panose="020B0502040204020203" pitchFamily="34" charset="0"/>
+                <a:cs typeface="Segoe UI" panose="020B0502040204020203" pitchFamily="34" charset="0"/>
+              </a:rPr>
+              <a:t>User data inputs per functional unit in xlsx</a:t>
+            </a:r>
+          </a:p>
+        </p:txBody>
+      </p:sp>
+      <p:sp>
+        <p:nvSpPr>
+          <p:cNvPr id="10" name="Rectangle 9">
+            <a:extLst>
+              <a:ext uri="{FF2B5EF4-FFF2-40B4-BE49-F238E27FC236}">
+                <a16:creationId xmlns:a16="http://schemas.microsoft.com/office/drawing/2014/main" id="{05586AFE-A81F-22A0-AC4F-2ED2B1CDB71C}"/>
+              </a:ext>
+            </a:extLst>
+          </p:cNvPr>
+          <p:cNvSpPr/>
+          <p:nvPr/>
+        </p:nvSpPr>
+        <p:spPr>
+          <a:xfrm>
+            <a:off x="2207905" y="728317"/>
+            <a:ext cx="4540028" cy="327729"/>
+          </a:xfrm>
+          <a:prstGeom prst="rect">
+            <a:avLst/>
+          </a:prstGeom>
+          <a:solidFill>
+            <a:schemeClr val="accent1"/>
+          </a:solidFill>
+          <a:ln>
+            <a:noFill/>
+          </a:ln>
+        </p:spPr>
+        <p:style>
+          <a:lnRef idx="2">
+            <a:schemeClr val="accent3"/>
+          </a:lnRef>
+          <a:fillRef idx="1">
+            <a:schemeClr val="lt1"/>
+          </a:fillRef>
+          <a:effectRef idx="0">
+            <a:schemeClr val="accent3"/>
+          </a:effectRef>
+          <a:fontRef idx="minor">
+            <a:schemeClr val="dk1"/>
+          </a:fontRef>
+        </p:style>
+        <p:txBody>
+          <a:bodyPr rtlCol="0" anchor="ctr"/>
+          <a:lstStyle/>
+          <a:p>
+            <a:pPr algn="ctr"/>
+            <a:r>
+              <a:rPr lang="en-US" sz="1600" dirty="0">
+                <a:solidFill>
+                  <a:schemeClr val="bg1"/>
+                </a:solidFill>
+                <a:latin typeface="Segoe UI" panose="020B0502040204020203" pitchFamily="34" charset="0"/>
+                <a:cs typeface="Segoe UI" panose="020B0502040204020203" pitchFamily="34" charset="0"/>
+              </a:rPr>
+              <a:t>Read and preprocess data</a:t>
+            </a:r>
+          </a:p>
+        </p:txBody>
+      </p:sp>
+    </p:spTree>
+    <p:extLst>
+      <p:ext uri="{BB962C8B-B14F-4D97-AF65-F5344CB8AC3E}">
+        <p14:creationId xmlns:p14="http://schemas.microsoft.com/office/powerpoint/2010/main" val="2617817352"/>
       </p:ext>
     </p:extLst>
   </p:cSld>
@@ -7764,6 +7946,27 @@
 </file>
 
 <file path=customXml/item1.xml><?xml version="1.0" encoding="utf-8"?>
+<p:properties xmlns:p="http://schemas.microsoft.com/office/2006/metadata/properties" xmlns:xsi="http://www.w3.org/2001/XMLSchema-instance" xmlns:pc="http://schemas.microsoft.com/office/infopath/2007/PartnerControls">
+  <documentManagement>
+    <Newpublication xmlns="02610380-e6c0-40f3-856f-43bcf3056b81" xsi:nil="true"/>
+    <lcf76f155ced4ddcb4097134ff3c332f xmlns="02610380-e6c0-40f3-856f-43bcf3056b81">
+      <Terms xmlns="http://schemas.microsoft.com/office/infopath/2007/PartnerControls"/>
+    </lcf76f155ced4ddcb4097134ff3c332f>
+    <TaxCatchAll xmlns="5869ec9c-4f5e-45b9-9b35-efd8ea278043" xsi:nil="true"/>
+  </documentManagement>
+</p:properties>
+</file>
+
+<file path=customXml/item2.xml><?xml version="1.0" encoding="utf-8"?>
+<?mso-contentType ?>
+<FormTemplates xmlns="http://schemas.microsoft.com/sharepoint/v3/contenttype/forms">
+  <Display>DocumentLibraryForm</Display>
+  <Edit>DocumentLibraryForm</Edit>
+  <New>DocumentLibraryForm</New>
+</FormTemplates>
+</file>
+
+<file path=customXml/item3.xml><?xml version="1.0" encoding="utf-8"?>
 <ct:contentTypeSchema xmlns:ct="http://schemas.microsoft.com/office/2006/metadata/contentType" xmlns:ma="http://schemas.microsoft.com/office/2006/metadata/properties/metaAttributes" ct:_="" ma:_="" ma:contentTypeName="Document" ma:contentTypeID="0x0101001E95DEC550104F488EF16507A23E5A2E" ma:contentTypeVersion="17" ma:contentTypeDescription="Create a new document." ma:contentTypeScope="" ma:versionID="b3745e875d0a22ec6926847e46b5ee46">
   <xsd:schema xmlns:xsd="http://www.w3.org/2001/XMLSchema" xmlns:xs="http://www.w3.org/2001/XMLSchema" xmlns:p="http://schemas.microsoft.com/office/2006/metadata/properties" xmlns:ns2="02610380-e6c0-40f3-856f-43bcf3056b81" xmlns:ns3="5869ec9c-4f5e-45b9-9b35-efd8ea278043" targetNamespace="http://schemas.microsoft.com/office/2006/metadata/properties" ma:root="true" ma:fieldsID="77ce28275da3dc37fca06de1074519ff" ns2:_="" ns3:_="">
     <xsd:import namespace="02610380-e6c0-40f3-856f-43bcf3056b81"/>
@@ -8014,28 +8217,32 @@
 </ct:contentTypeSchema>
 </file>
 
-<file path=customXml/item2.xml><?xml version="1.0" encoding="utf-8"?>
-<?mso-contentType ?>
-<FormTemplates xmlns="http://schemas.microsoft.com/sharepoint/v3/contenttype/forms">
-  <Display>DocumentLibraryForm</Display>
-  <Edit>DocumentLibraryForm</Edit>
-  <New>DocumentLibraryForm</New>
-</FormTemplates>
+<file path=customXml/itemProps1.xml><?xml version="1.0" encoding="utf-8"?>
+<ds:datastoreItem xmlns:ds="http://schemas.openxmlformats.org/officeDocument/2006/customXml" ds:itemID="{AC4E9844-4AFB-46F3-AA21-1AB1A3D02EF4}">
+  <ds:schemaRefs>
+    <ds:schemaRef ds:uri="http://schemas.microsoft.com/office/2006/metadata/properties"/>
+    <ds:schemaRef ds:uri="http://purl.org/dc/terms/"/>
+    <ds:schemaRef ds:uri="http://schemas.microsoft.com/office/2006/documentManagement/types"/>
+    <ds:schemaRef ds:uri="http://purl.org/dc/dcmitype/"/>
+    <ds:schemaRef ds:uri="http://schemas.openxmlformats.org/package/2006/metadata/core-properties"/>
+    <ds:schemaRef ds:uri="http://purl.org/dc/elements/1.1/"/>
+    <ds:schemaRef ds:uri="http://schemas.microsoft.com/office/infopath/2007/PartnerControls"/>
+    <ds:schemaRef ds:uri="5869ec9c-4f5e-45b9-9b35-efd8ea278043"/>
+    <ds:schemaRef ds:uri="02610380-e6c0-40f3-856f-43bcf3056b81"/>
+    <ds:schemaRef ds:uri="http://www.w3.org/XML/1998/namespace"/>
+  </ds:schemaRefs>
+</ds:datastoreItem>
 </file>
 
-<file path=customXml/item3.xml><?xml version="1.0" encoding="utf-8"?>
-<p:properties xmlns:p="http://schemas.microsoft.com/office/2006/metadata/properties" xmlns:xsi="http://www.w3.org/2001/XMLSchema-instance" xmlns:pc="http://schemas.microsoft.com/office/infopath/2007/PartnerControls">
-  <documentManagement>
-    <Newpublication xmlns="02610380-e6c0-40f3-856f-43bcf3056b81" xsi:nil="true"/>
-    <lcf76f155ced4ddcb4097134ff3c332f xmlns="02610380-e6c0-40f3-856f-43bcf3056b81">
-      <Terms xmlns="http://schemas.microsoft.com/office/infopath/2007/PartnerControls"/>
-    </lcf76f155ced4ddcb4097134ff3c332f>
-    <TaxCatchAll xmlns="5869ec9c-4f5e-45b9-9b35-efd8ea278043" xsi:nil="true"/>
-  </documentManagement>
-</p:properties>
+<file path=customXml/itemProps2.xml><?xml version="1.0" encoding="utf-8"?>
+<ds:datastoreItem xmlns:ds="http://schemas.openxmlformats.org/officeDocument/2006/customXml" ds:itemID="{35509BDC-E805-4F7C-9A9B-F34755EFE390}">
+  <ds:schemaRefs>
+    <ds:schemaRef ds:uri="http://schemas.microsoft.com/sharepoint/v3/contenttype/forms"/>
+  </ds:schemaRefs>
+</ds:datastoreItem>
 </file>
 
-<file path=customXml/itemProps1.xml><?xml version="1.0" encoding="utf-8"?>
+<file path=customXml/itemProps3.xml><?xml version="1.0" encoding="utf-8"?>
 <ds:datastoreItem xmlns:ds="http://schemas.openxmlformats.org/officeDocument/2006/customXml" ds:itemID="{A6E0694E-38CE-4C13-9761-2ED55123F14A}">
   <ds:schemaRefs>
     <ds:schemaRef ds:uri="http://schemas.microsoft.com/office/2006/metadata/contentType"/>
@@ -8052,29 +8259,4 @@
     <ds:schemaRef ds:uri="http://schemas.microsoft.com/internal/obd"/>
   </ds:schemaRefs>
 </ds:datastoreItem>
-</file>
-
-<file path=customXml/itemProps2.xml><?xml version="1.0" encoding="utf-8"?>
-<ds:datastoreItem xmlns:ds="http://schemas.openxmlformats.org/officeDocument/2006/customXml" ds:itemID="{35509BDC-E805-4F7C-9A9B-F34755EFE390}">
-  <ds:schemaRefs>
-    <ds:schemaRef ds:uri="http://schemas.microsoft.com/sharepoint/v3/contenttype/forms"/>
-  </ds:schemaRefs>
-</ds:datastoreItem>
-</file>
-
-<file path=customXml/itemProps3.xml><?xml version="1.0" encoding="utf-8"?>
-<ds:datastoreItem xmlns:ds="http://schemas.openxmlformats.org/officeDocument/2006/customXml" ds:itemID="{AC4E9844-4AFB-46F3-AA21-1AB1A3D02EF4}">
-  <ds:schemaRefs>
-    <ds:schemaRef ds:uri="http://schemas.microsoft.com/office/2006/metadata/properties"/>
-    <ds:schemaRef ds:uri="http://purl.org/dc/terms/"/>
-    <ds:schemaRef ds:uri="http://schemas.microsoft.com/office/2006/documentManagement/types"/>
-    <ds:schemaRef ds:uri="http://purl.org/dc/dcmitype/"/>
-    <ds:schemaRef ds:uri="http://schemas.openxmlformats.org/package/2006/metadata/core-properties"/>
-    <ds:schemaRef ds:uri="http://purl.org/dc/elements/1.1/"/>
-    <ds:schemaRef ds:uri="http://schemas.microsoft.com/office/infopath/2007/PartnerControls"/>
-    <ds:schemaRef ds:uri="5869ec9c-4f5e-45b9-9b35-efd8ea278043"/>
-    <ds:schemaRef ds:uri="02610380-e6c0-40f3-856f-43bcf3056b81"/>
-    <ds:schemaRef ds:uri="http://www.w3.org/XML/1998/namespace"/>
-  </ds:schemaRefs>
-</ds:datastoreItem>
 </file>
</xml_diff>